<commit_message>
rearrange files, move dieos out of this repo and add diary gjw version
</commit_message>
<xml_diff>
--- a/mid-term-pre/presentation_slides_v2.pptx
+++ b/mid-term-pre/presentation_slides_v2.pptx
@@ -4741,8 +4741,13 @@
             </a:r>
             <a:r>
               <a:rPr lang="en-US" dirty="0"/>
-              <a:t> This component resides on both the client-side and the server-side. </a:t>
-            </a:r>
+              <a:t> This component resides </a:t>
+            </a:r>
+            <a:r>
+              <a:rPr lang="en-US"/>
+              <a:t>on client-side. </a:t>
+            </a:r>
+            <a:endParaRPr lang="en-US" dirty="0"/>
           </a:p>
           <a:p>
             <a:r>

</xml_diff>